<commit_message>
small update on the slide deck
</commit_message>
<xml_diff>
--- a/ECE4180RobotSildes.pptx
+++ b/ECE4180RobotSildes.pptx
@@ -114,6 +114,11 @@
       </a:defRPr>
     </a:lvl9pPr>
   </p:defaultTextStyle>
+  <p:extLst>
+    <p:ext uri="{EFAFB233-063F-42B5-8137-9DF3F51BA10A}">
+      <p15:sldGuideLst xmlns:p15="http://schemas.microsoft.com/office/powerpoint/2012/main"/>
+    </p:ext>
+  </p:extLst>
 </p:presentation>
 </file>
 
@@ -1997,7 +2002,7 @@
 <dgm:dataModel xmlns:dgm="http://schemas.openxmlformats.org/drawingml/2006/diagram" xmlns:a="http://schemas.openxmlformats.org/drawingml/2006/main">
   <dgm:ptLst>
     <dgm:pt modelId="{764FD179-E2D3-4D11-A270-49EB741C5EBB}" type="doc">
-      <dgm:prSet loTypeId="urn:microsoft.com/office/officeart/2008/layout/LinedList" loCatId="list" qsTypeId="urn:microsoft.com/office/officeart/2005/8/quickstyle/simple1" qsCatId="simple" csTypeId="urn:microsoft.com/office/officeart/2005/8/colors/accent1_2" csCatId="accent1"/>
+      <dgm:prSet loTypeId="urn:microsoft.com/office/officeart/2008/layout/LinedList" loCatId="list" qsTypeId="urn:microsoft.com/office/officeart/2005/8/quickstyle/simple1" qsCatId="simple" csTypeId="urn:microsoft.com/office/officeart/2005/8/colors/accent1_2" csCatId="accent1" phldr="1"/>
       <dgm:spPr/>
       <dgm:t>
         <a:bodyPr/>
@@ -2015,10 +2020,10 @@
         <a:lstStyle/>
         <a:p>
           <a:r>
-            <a:rPr lang="en-US" b="0" i="0"/>
-            <a:t>Whenever there's an object within 50mm of the sensing range, no matter what the robot is doing (moving forward or idling), it immediately stops and turns right to avoid collisions</a:t>
+            <a:rPr lang="en-US" b="0" i="0" dirty="0"/>
+            <a:t>Whenever there's an object within 300mm of the sensing range, no matter what the robot is doing (moving forward or idling), it immediately stops and turns right to avoid collisions</a:t>
           </a:r>
-          <a:endParaRPr lang="en-US"/>
+          <a:endParaRPr lang="en-US" dirty="0"/>
         </a:p>
       </dgm:t>
     </dgm:pt>
@@ -2927,10 +2932,10 @@
             <a:buNone/>
           </a:pPr>
           <a:r>
-            <a:rPr lang="en-US" sz="2200" b="0" i="0" kern="1200"/>
-            <a:t>Whenever there's an object within 50mm of the sensing range, no matter what the robot is doing (moving forward or idling), it immediately stops and turns right to avoid collisions</a:t>
+            <a:rPr lang="en-US" sz="2200" b="0" i="0" kern="1200" dirty="0"/>
+            <a:t>Whenever there's an object within 300mm of the sensing range, no matter what the robot is doing (moving forward or idling), it immediately stops and turns right to avoid collisions</a:t>
           </a:r>
-          <a:endParaRPr lang="en-US" sz="2200" kern="1200"/>
+          <a:endParaRPr lang="en-US" sz="2200" kern="1200" dirty="0"/>
         </a:p>
       </dsp:txBody>
       <dsp:txXfrm>
@@ -6422,7 +6427,7 @@
           <a:p>
             <a:fld id="{58BFA0DD-DCCA-5547-A863-22803AB2CCEC}" type="datetimeFigureOut">
               <a:rPr lang="en-US" smtClean="0"/>
-              <a:t>4/29/23</a:t>
+              <a:t>5/1/2023</a:t>
             </a:fld>
             <a:endParaRPr lang="en-US"/>
           </a:p>
@@ -6620,7 +6625,7 @@
           <a:p>
             <a:fld id="{58BFA0DD-DCCA-5547-A863-22803AB2CCEC}" type="datetimeFigureOut">
               <a:rPr lang="en-US" smtClean="0"/>
-              <a:t>4/29/23</a:t>
+              <a:t>5/1/2023</a:t>
             </a:fld>
             <a:endParaRPr lang="en-US"/>
           </a:p>
@@ -6828,7 +6833,7 @@
           <a:p>
             <a:fld id="{58BFA0DD-DCCA-5547-A863-22803AB2CCEC}" type="datetimeFigureOut">
               <a:rPr lang="en-US" smtClean="0"/>
-              <a:t>4/29/23</a:t>
+              <a:t>5/1/2023</a:t>
             </a:fld>
             <a:endParaRPr lang="en-US"/>
           </a:p>
@@ -7026,7 +7031,7 @@
           <a:p>
             <a:fld id="{58BFA0DD-DCCA-5547-A863-22803AB2CCEC}" type="datetimeFigureOut">
               <a:rPr lang="en-US" smtClean="0"/>
-              <a:t>4/29/23</a:t>
+              <a:t>5/1/2023</a:t>
             </a:fld>
             <a:endParaRPr lang="en-US"/>
           </a:p>
@@ -7301,7 +7306,7 @@
           <a:p>
             <a:fld id="{58BFA0DD-DCCA-5547-A863-22803AB2CCEC}" type="datetimeFigureOut">
               <a:rPr lang="en-US" smtClean="0"/>
-              <a:t>4/29/23</a:t>
+              <a:t>5/1/2023</a:t>
             </a:fld>
             <a:endParaRPr lang="en-US"/>
           </a:p>
@@ -7566,7 +7571,7 @@
           <a:p>
             <a:fld id="{58BFA0DD-DCCA-5547-A863-22803AB2CCEC}" type="datetimeFigureOut">
               <a:rPr lang="en-US" smtClean="0"/>
-              <a:t>4/29/23</a:t>
+              <a:t>5/1/2023</a:t>
             </a:fld>
             <a:endParaRPr lang="en-US"/>
           </a:p>
@@ -7978,7 +7983,7 @@
           <a:p>
             <a:fld id="{58BFA0DD-DCCA-5547-A863-22803AB2CCEC}" type="datetimeFigureOut">
               <a:rPr lang="en-US" smtClean="0"/>
-              <a:t>4/29/23</a:t>
+              <a:t>5/1/2023</a:t>
             </a:fld>
             <a:endParaRPr lang="en-US"/>
           </a:p>
@@ -8119,7 +8124,7 @@
           <a:p>
             <a:fld id="{58BFA0DD-DCCA-5547-A863-22803AB2CCEC}" type="datetimeFigureOut">
               <a:rPr lang="en-US" smtClean="0"/>
-              <a:t>4/29/23</a:t>
+              <a:t>5/1/2023</a:t>
             </a:fld>
             <a:endParaRPr lang="en-US"/>
           </a:p>
@@ -8232,7 +8237,7 @@
           <a:p>
             <a:fld id="{58BFA0DD-DCCA-5547-A863-22803AB2CCEC}" type="datetimeFigureOut">
               <a:rPr lang="en-US" smtClean="0"/>
-              <a:t>4/29/23</a:t>
+              <a:t>5/1/2023</a:t>
             </a:fld>
             <a:endParaRPr lang="en-US"/>
           </a:p>
@@ -8543,7 +8548,7 @@
           <a:p>
             <a:fld id="{58BFA0DD-DCCA-5547-A863-22803AB2CCEC}" type="datetimeFigureOut">
               <a:rPr lang="en-US" smtClean="0"/>
-              <a:t>4/29/23</a:t>
+              <a:t>5/1/2023</a:t>
             </a:fld>
             <a:endParaRPr lang="en-US"/>
           </a:p>
@@ -8831,7 +8836,7 @@
           <a:p>
             <a:fld id="{58BFA0DD-DCCA-5547-A863-22803AB2CCEC}" type="datetimeFigureOut">
               <a:rPr lang="en-US" smtClean="0"/>
-              <a:t>4/29/23</a:t>
+              <a:t>5/1/2023</a:t>
             </a:fld>
             <a:endParaRPr lang="en-US"/>
           </a:p>
@@ -9072,7 +9077,7 @@
           <a:p>
             <a:fld id="{58BFA0DD-DCCA-5547-A863-22803AB2CCEC}" type="datetimeFigureOut">
               <a:rPr lang="en-US" smtClean="0"/>
-              <a:t>4/29/23</a:t>
+              <a:t>5/1/2023</a:t>
             </a:fld>
             <a:endParaRPr lang="en-US"/>
           </a:p>
@@ -12812,6 +12817,11 @@
           </p:cNvGraphicFramePr>
           <p:nvPr>
             <p:ph idx="1"/>
+            <p:extLst>
+              <p:ext uri="{D42A27DB-BD31-4B8C-83A1-F6EECF244321}">
+                <p14:modId xmlns:p14="http://schemas.microsoft.com/office/powerpoint/2010/main" val="2856310648"/>
+              </p:ext>
+            </p:extLst>
           </p:nvPr>
         </p:nvGraphicFramePr>
         <p:xfrm>

</xml_diff>